<commit_message>
Changes to report Single loop structure Master process also does local calculations
</commit_message>
<xml_diff>
--- a/page_rank/Page rank in parallel.pptx
+++ b/page_rank/Page rank in parallel.pptx
@@ -11,6 +11,7 @@
     <p:sldId id="259" r:id="rId5"/>
     <p:sldId id="260" r:id="rId6"/>
     <p:sldId id="261" r:id="rId7"/>
+    <p:sldId id="262" r:id="rId8"/>
   </p:sldIdLst>
   <p:sldSz cx="12192000" cy="6858000"/>
   <p:notesSz cx="6858000" cy="9144000"/>
@@ -109,6 +110,11 @@
       </a:defRPr>
     </a:lvl9pPr>
   </p:defaultTextStyle>
+  <p:extLst>
+    <p:ext uri="{EFAFB233-063F-42B5-8137-9DF3F51BA10A}">
+      <p15:sldGuideLst xmlns:p15="http://schemas.microsoft.com/office/powerpoint/2012/main"/>
+    </p:ext>
+  </p:extLst>
 </p:presentation>
 </file>
 
@@ -243,7 +249,7 @@
           <a:p>
             <a:fld id="{469661F1-944B-4BE3-8775-EA59494A5057}" type="datetimeFigureOut">
               <a:rPr lang="en-GB" smtClean="0"/>
-              <a:t>10/04/2016</a:t>
+              <a:t>14/04/2016</a:t>
             </a:fld>
             <a:endParaRPr lang="en-GB"/>
           </a:p>
@@ -413,7 +419,7 @@
           <a:p>
             <a:fld id="{469661F1-944B-4BE3-8775-EA59494A5057}" type="datetimeFigureOut">
               <a:rPr lang="en-GB" smtClean="0"/>
-              <a:t>10/04/2016</a:t>
+              <a:t>14/04/2016</a:t>
             </a:fld>
             <a:endParaRPr lang="en-GB"/>
           </a:p>
@@ -593,7 +599,7 @@
           <a:p>
             <a:fld id="{469661F1-944B-4BE3-8775-EA59494A5057}" type="datetimeFigureOut">
               <a:rPr lang="en-GB" smtClean="0"/>
-              <a:t>10/04/2016</a:t>
+              <a:t>14/04/2016</a:t>
             </a:fld>
             <a:endParaRPr lang="en-GB"/>
           </a:p>
@@ -763,7 +769,7 @@
           <a:p>
             <a:fld id="{469661F1-944B-4BE3-8775-EA59494A5057}" type="datetimeFigureOut">
               <a:rPr lang="en-GB" smtClean="0"/>
-              <a:t>10/04/2016</a:t>
+              <a:t>14/04/2016</a:t>
             </a:fld>
             <a:endParaRPr lang="en-GB"/>
           </a:p>
@@ -1009,7 +1015,7 @@
           <a:p>
             <a:fld id="{469661F1-944B-4BE3-8775-EA59494A5057}" type="datetimeFigureOut">
               <a:rPr lang="en-GB" smtClean="0"/>
-              <a:t>10/04/2016</a:t>
+              <a:t>14/04/2016</a:t>
             </a:fld>
             <a:endParaRPr lang="en-GB"/>
           </a:p>
@@ -1241,7 +1247,7 @@
           <a:p>
             <a:fld id="{469661F1-944B-4BE3-8775-EA59494A5057}" type="datetimeFigureOut">
               <a:rPr lang="en-GB" smtClean="0"/>
-              <a:t>10/04/2016</a:t>
+              <a:t>14/04/2016</a:t>
             </a:fld>
             <a:endParaRPr lang="en-GB"/>
           </a:p>
@@ -1608,7 +1614,7 @@
           <a:p>
             <a:fld id="{469661F1-944B-4BE3-8775-EA59494A5057}" type="datetimeFigureOut">
               <a:rPr lang="en-GB" smtClean="0"/>
-              <a:t>10/04/2016</a:t>
+              <a:t>14/04/2016</a:t>
             </a:fld>
             <a:endParaRPr lang="en-GB"/>
           </a:p>
@@ -1726,7 +1732,7 @@
           <a:p>
             <a:fld id="{469661F1-944B-4BE3-8775-EA59494A5057}" type="datetimeFigureOut">
               <a:rPr lang="en-GB" smtClean="0"/>
-              <a:t>10/04/2016</a:t>
+              <a:t>14/04/2016</a:t>
             </a:fld>
             <a:endParaRPr lang="en-GB"/>
           </a:p>
@@ -1821,7 +1827,7 @@
           <a:p>
             <a:fld id="{469661F1-944B-4BE3-8775-EA59494A5057}" type="datetimeFigureOut">
               <a:rPr lang="en-GB" smtClean="0"/>
-              <a:t>10/04/2016</a:t>
+              <a:t>14/04/2016</a:t>
             </a:fld>
             <a:endParaRPr lang="en-GB"/>
           </a:p>
@@ -2098,7 +2104,7 @@
           <a:p>
             <a:fld id="{469661F1-944B-4BE3-8775-EA59494A5057}" type="datetimeFigureOut">
               <a:rPr lang="en-GB" smtClean="0"/>
-              <a:t>10/04/2016</a:t>
+              <a:t>14/04/2016</a:t>
             </a:fld>
             <a:endParaRPr lang="en-GB"/>
           </a:p>
@@ -2351,7 +2357,7 @@
           <a:p>
             <a:fld id="{469661F1-944B-4BE3-8775-EA59494A5057}" type="datetimeFigureOut">
               <a:rPr lang="en-GB" smtClean="0"/>
-              <a:t>10/04/2016</a:t>
+              <a:t>14/04/2016</a:t>
             </a:fld>
             <a:endParaRPr lang="en-GB"/>
           </a:p>
@@ -2564,7 +2570,7 @@
           <a:p>
             <a:fld id="{469661F1-944B-4BE3-8775-EA59494A5057}" type="datetimeFigureOut">
               <a:rPr lang="en-GB" smtClean="0"/>
-              <a:t>10/04/2016</a:t>
+              <a:t>14/04/2016</a:t>
             </a:fld>
             <a:endParaRPr lang="en-GB"/>
           </a:p>
@@ -2986,7 +2992,11 @@
           <a:p>
             <a:r>
               <a:rPr lang="en-GB" dirty="0" smtClean="0"/>
-              <a:t>Page rank in parallel</a:t>
+              <a:t>Page rank </a:t>
+            </a:r>
+            <a:r>
+              <a:rPr lang="en-GB" dirty="0" smtClean="0"/>
+              <a:t>algorithm with MPI</a:t>
             </a:r>
             <a:endParaRPr lang="en-GB" dirty="0"/>
           </a:p>
@@ -3141,8 +3151,12 @@
               </a:lnSpc>
             </a:pPr>
             <a:r>
+              <a:rPr lang="en-US" sz="1800" b="1" dirty="0" smtClean="0"/>
+              <a:t>Example_matrix.csv </a:t>
+            </a:r>
+            <a:r>
               <a:rPr lang="en-US" sz="1800" b="1" dirty="0"/>
-              <a:t>Example_test_matrix.csv /.</a:t>
+              <a:t>/.</a:t>
             </a:r>
             <a:r>
               <a:rPr lang="en-US" sz="1800" b="1" dirty="0" err="1"/>
@@ -3495,7 +3509,15 @@
           <a:p>
             <a:r>
               <a:rPr lang="en-GB" dirty="0" smtClean="0"/>
-              <a:t>The power iteration method is used.</a:t>
+              <a:t>The </a:t>
+            </a:r>
+            <a:r>
+              <a:rPr lang="en-GB" b="1" dirty="0" smtClean="0"/>
+              <a:t>power iteration </a:t>
+            </a:r>
+            <a:r>
+              <a:rPr lang="en-GB" dirty="0" smtClean="0"/>
+              <a:t>method is used.</a:t>
             </a:r>
           </a:p>
           <a:p>
@@ -3676,7 +3698,15 @@
           <a:p>
             <a:r>
               <a:rPr lang="en-GB" dirty="0" smtClean="0"/>
-              <a:t>Adjacency matrix and page rank can be found in example_test_matrix.xlsx and pagerank.csv</a:t>
+              <a:t>Adjacency matrix and page rank can be found in </a:t>
+            </a:r>
+            <a:r>
+              <a:rPr lang="en-GB" dirty="0" smtClean="0"/>
+              <a:t>example_matrix.xlsx </a:t>
+            </a:r>
+            <a:r>
+              <a:rPr lang="en-GB" dirty="0" smtClean="0"/>
+              <a:t>and pagerank.csv</a:t>
             </a:r>
           </a:p>
           <a:p>
@@ -3694,6 +3724,65 @@
     <p:extLst>
       <p:ext uri="{BB962C8B-B14F-4D97-AF65-F5344CB8AC3E}">
         <p14:creationId xmlns:p14="http://schemas.microsoft.com/office/powerpoint/2010/main" val="4256760236"/>
+      </p:ext>
+    </p:extLst>
+  </p:cSld>
+  <p:clrMapOvr>
+    <a:masterClrMapping/>
+  </p:clrMapOvr>
+</p:sld>
+</file>
+
+<file path=ppt/slides/slide7.xml><?xml version="1.0" encoding="utf-8"?>
+<p:sld xmlns:a="http://schemas.openxmlformats.org/drawingml/2006/main" xmlns:r="http://schemas.openxmlformats.org/officeDocument/2006/relationships" xmlns:p="http://schemas.openxmlformats.org/presentationml/2006/main">
+  <p:cSld>
+    <p:spTree>
+      <p:nvGrpSpPr>
+        <p:cNvPr id="1" name=""/>
+        <p:cNvGrpSpPr/>
+        <p:nvPr/>
+      </p:nvGrpSpPr>
+      <p:grpSpPr>
+        <a:xfrm>
+          <a:off x="0" y="0"/>
+          <a:ext cx="0" cy="0"/>
+          <a:chOff x="0" y="0"/>
+          <a:chExt cx="0" cy="0"/>
+        </a:xfrm>
+      </p:grpSpPr>
+      <p:sp>
+        <p:nvSpPr>
+          <p:cNvPr id="2" name="Title 1"/>
+          <p:cNvSpPr>
+            <a:spLocks noGrp="1"/>
+          </p:cNvSpPr>
+          <p:nvPr>
+            <p:ph type="title"/>
+          </p:nvPr>
+        </p:nvSpPr>
+        <p:spPr>
+          <a:xfrm>
+            <a:off x="783021" y="2525001"/>
+            <a:ext cx="10515600" cy="1325563"/>
+          </a:xfrm>
+        </p:spPr>
+        <p:txBody>
+          <a:bodyPr/>
+          <a:lstStyle/>
+          <a:p>
+            <a:pPr algn="ctr"/>
+            <a:r>
+              <a:rPr lang="en-GB" dirty="0" smtClean="0"/>
+              <a:t>See report.docx for more information</a:t>
+            </a:r>
+            <a:endParaRPr lang="en-GB" dirty="0"/>
+          </a:p>
+        </p:txBody>
+      </p:sp>
+    </p:spTree>
+    <p:extLst>
+      <p:ext uri="{BB962C8B-B14F-4D97-AF65-F5344CB8AC3E}">
+        <p14:creationId xmlns:p14="http://schemas.microsoft.com/office/powerpoint/2010/main" val="1338240895"/>
       </p:ext>
     </p:extLst>
   </p:cSld>

</xml_diff>